<commit_message>
fixed buffer length KB -> Bytes
</commit_message>
<xml_diff>
--- a/img/Evaluation-Bandwidth-Wondershaper.pptx
+++ b/img/Evaluation-Bandwidth-Wondershaper.pptx
@@ -104,6 +104,11 @@
       </a:defRPr>
     </a:lvl9pPr>
   </p:defaultTextStyle>
+  <p:extLst>
+    <p:ext uri="{EFAFB233-063F-42B5-8137-9DF3F51BA10A}">
+      <p15:sldGuideLst xmlns:p15="http://schemas.microsoft.com/office/powerpoint/2012/main"/>
+    </p:ext>
+  </p:extLst>
 </p:presentation>
 </file>
 
@@ -656,9 +661,14 @@
                   </a:defRPr>
                 </a:pPr>
                 <a:r>
+                  <a:rPr lang="de-CH" sz="1600" dirty="0"/>
+                  <a:t>Buffer </a:t>
+                </a:r>
+                <a:r>
                   <a:rPr lang="de-CH" sz="1600"/>
-                  <a:t>Buffer Size [KB]</a:t>
+                  <a:t>Size [Bytes]</a:t>
                 </a:r>
+                <a:endParaRPr lang="de-CH" sz="1600" dirty="0"/>
               </a:p>
             </c:rich>
           </c:tx>
@@ -1622,7 +1632,7 @@
           <a:p>
             <a:fld id="{92DFD1F9-40AA-4D0E-B131-78FC6F0D1028}" type="datetimeFigureOut">
               <a:rPr lang="en-US" smtClean="0"/>
-              <a:t>6/16/2019</a:t>
+              <a:t>7/1/2019</a:t>
             </a:fld>
             <a:endParaRPr lang="en-US"/>
           </a:p>
@@ -1822,7 +1832,7 @@
           <a:p>
             <a:fld id="{92DFD1F9-40AA-4D0E-B131-78FC6F0D1028}" type="datetimeFigureOut">
               <a:rPr lang="en-US" smtClean="0"/>
-              <a:t>6/16/2019</a:t>
+              <a:t>7/1/2019</a:t>
             </a:fld>
             <a:endParaRPr lang="en-US"/>
           </a:p>
@@ -2032,7 +2042,7 @@
           <a:p>
             <a:fld id="{92DFD1F9-40AA-4D0E-B131-78FC6F0D1028}" type="datetimeFigureOut">
               <a:rPr lang="en-US" smtClean="0"/>
-              <a:t>6/16/2019</a:t>
+              <a:t>7/1/2019</a:t>
             </a:fld>
             <a:endParaRPr lang="en-US"/>
           </a:p>
@@ -2232,7 +2242,7 @@
           <a:p>
             <a:fld id="{92DFD1F9-40AA-4D0E-B131-78FC6F0D1028}" type="datetimeFigureOut">
               <a:rPr lang="en-US" smtClean="0"/>
-              <a:t>6/16/2019</a:t>
+              <a:t>7/1/2019</a:t>
             </a:fld>
             <a:endParaRPr lang="en-US"/>
           </a:p>
@@ -2508,7 +2518,7 @@
           <a:p>
             <a:fld id="{92DFD1F9-40AA-4D0E-B131-78FC6F0D1028}" type="datetimeFigureOut">
               <a:rPr lang="en-US" smtClean="0"/>
-              <a:t>6/16/2019</a:t>
+              <a:t>7/1/2019</a:t>
             </a:fld>
             <a:endParaRPr lang="en-US"/>
           </a:p>
@@ -2776,7 +2786,7 @@
           <a:p>
             <a:fld id="{92DFD1F9-40AA-4D0E-B131-78FC6F0D1028}" type="datetimeFigureOut">
               <a:rPr lang="en-US" smtClean="0"/>
-              <a:t>6/16/2019</a:t>
+              <a:t>7/1/2019</a:t>
             </a:fld>
             <a:endParaRPr lang="en-US"/>
           </a:p>
@@ -3191,7 +3201,7 @@
           <a:p>
             <a:fld id="{92DFD1F9-40AA-4D0E-B131-78FC6F0D1028}" type="datetimeFigureOut">
               <a:rPr lang="en-US" smtClean="0"/>
-              <a:t>6/16/2019</a:t>
+              <a:t>7/1/2019</a:t>
             </a:fld>
             <a:endParaRPr lang="en-US"/>
           </a:p>
@@ -3333,7 +3343,7 @@
           <a:p>
             <a:fld id="{92DFD1F9-40AA-4D0E-B131-78FC6F0D1028}" type="datetimeFigureOut">
               <a:rPr lang="en-US" smtClean="0"/>
-              <a:t>6/16/2019</a:t>
+              <a:t>7/1/2019</a:t>
             </a:fld>
             <a:endParaRPr lang="en-US"/>
           </a:p>
@@ -3446,7 +3456,7 @@
           <a:p>
             <a:fld id="{92DFD1F9-40AA-4D0E-B131-78FC6F0D1028}" type="datetimeFigureOut">
               <a:rPr lang="en-US" smtClean="0"/>
-              <a:t>6/16/2019</a:t>
+              <a:t>7/1/2019</a:t>
             </a:fld>
             <a:endParaRPr lang="en-US"/>
           </a:p>
@@ -3759,7 +3769,7 @@
           <a:p>
             <a:fld id="{92DFD1F9-40AA-4D0E-B131-78FC6F0D1028}" type="datetimeFigureOut">
               <a:rPr lang="en-US" smtClean="0"/>
-              <a:t>6/16/2019</a:t>
+              <a:t>7/1/2019</a:t>
             </a:fld>
             <a:endParaRPr lang="en-US"/>
           </a:p>
@@ -4048,7 +4058,7 @@
           <a:p>
             <a:fld id="{92DFD1F9-40AA-4D0E-B131-78FC6F0D1028}" type="datetimeFigureOut">
               <a:rPr lang="en-US" smtClean="0"/>
-              <a:t>6/16/2019</a:t>
+              <a:t>7/1/2019</a:t>
             </a:fld>
             <a:endParaRPr lang="en-US"/>
           </a:p>
@@ -4291,7 +4301,7 @@
           <a:p>
             <a:fld id="{92DFD1F9-40AA-4D0E-B131-78FC6F0D1028}" type="datetimeFigureOut">
               <a:rPr lang="en-US" smtClean="0"/>
-              <a:t>6/16/2019</a:t>
+              <a:t>7/1/2019</a:t>
             </a:fld>
             <a:endParaRPr lang="en-US"/>
           </a:p>
@@ -4723,7 +4733,7 @@
           <p:nvPr>
             <p:extLst>
               <p:ext uri="{D42A27DB-BD31-4B8C-83A1-F6EECF244321}">
-                <p14:modId xmlns:p14="http://schemas.microsoft.com/office/powerpoint/2010/main" val="467797019"/>
+                <p14:modId xmlns:p14="http://schemas.microsoft.com/office/powerpoint/2010/main" val="26095860"/>
               </p:ext>
             </p:extLst>
           </p:nvPr>

</xml_diff>

<commit_message>
changed buffer to datagram
</commit_message>
<xml_diff>
--- a/img/Evaluation-Bandwidth-Wondershaper.pptx
+++ b/img/Evaluation-Bandwidth-Wondershaper.pptx
@@ -661,14 +661,13 @@
                   </a:defRPr>
                 </a:pPr>
                 <a:r>
-                  <a:rPr lang="de-CH" sz="1600" dirty="0"/>
-                  <a:t>Buffer </a:t>
+                  <a:rPr lang="de-CH" sz="1600"/>
+                  <a:t>Datagram </a:t>
                 </a:r>
                 <a:r>
-                  <a:rPr lang="de-CH" sz="1600"/>
+                  <a:rPr lang="de-CH" sz="1600" dirty="0"/>
                   <a:t>Size [Bytes]</a:t>
                 </a:r>
-                <a:endParaRPr lang="de-CH" sz="1600" dirty="0"/>
               </a:p>
             </c:rich>
           </c:tx>
@@ -1632,7 +1631,7 @@
           <a:p>
             <a:fld id="{92DFD1F9-40AA-4D0E-B131-78FC6F0D1028}" type="datetimeFigureOut">
               <a:rPr lang="en-US" smtClean="0"/>
-              <a:t>7/1/2019</a:t>
+              <a:t>7/16/2019</a:t>
             </a:fld>
             <a:endParaRPr lang="en-US"/>
           </a:p>
@@ -1832,7 +1831,7 @@
           <a:p>
             <a:fld id="{92DFD1F9-40AA-4D0E-B131-78FC6F0D1028}" type="datetimeFigureOut">
               <a:rPr lang="en-US" smtClean="0"/>
-              <a:t>7/1/2019</a:t>
+              <a:t>7/16/2019</a:t>
             </a:fld>
             <a:endParaRPr lang="en-US"/>
           </a:p>
@@ -2042,7 +2041,7 @@
           <a:p>
             <a:fld id="{92DFD1F9-40AA-4D0E-B131-78FC6F0D1028}" type="datetimeFigureOut">
               <a:rPr lang="en-US" smtClean="0"/>
-              <a:t>7/1/2019</a:t>
+              <a:t>7/16/2019</a:t>
             </a:fld>
             <a:endParaRPr lang="en-US"/>
           </a:p>
@@ -2242,7 +2241,7 @@
           <a:p>
             <a:fld id="{92DFD1F9-40AA-4D0E-B131-78FC6F0D1028}" type="datetimeFigureOut">
               <a:rPr lang="en-US" smtClean="0"/>
-              <a:t>7/1/2019</a:t>
+              <a:t>7/16/2019</a:t>
             </a:fld>
             <a:endParaRPr lang="en-US"/>
           </a:p>
@@ -2518,7 +2517,7 @@
           <a:p>
             <a:fld id="{92DFD1F9-40AA-4D0E-B131-78FC6F0D1028}" type="datetimeFigureOut">
               <a:rPr lang="en-US" smtClean="0"/>
-              <a:t>7/1/2019</a:t>
+              <a:t>7/16/2019</a:t>
             </a:fld>
             <a:endParaRPr lang="en-US"/>
           </a:p>
@@ -2786,7 +2785,7 @@
           <a:p>
             <a:fld id="{92DFD1F9-40AA-4D0E-B131-78FC6F0D1028}" type="datetimeFigureOut">
               <a:rPr lang="en-US" smtClean="0"/>
-              <a:t>7/1/2019</a:t>
+              <a:t>7/16/2019</a:t>
             </a:fld>
             <a:endParaRPr lang="en-US"/>
           </a:p>
@@ -3201,7 +3200,7 @@
           <a:p>
             <a:fld id="{92DFD1F9-40AA-4D0E-B131-78FC6F0D1028}" type="datetimeFigureOut">
               <a:rPr lang="en-US" smtClean="0"/>
-              <a:t>7/1/2019</a:t>
+              <a:t>7/16/2019</a:t>
             </a:fld>
             <a:endParaRPr lang="en-US"/>
           </a:p>
@@ -3343,7 +3342,7 @@
           <a:p>
             <a:fld id="{92DFD1F9-40AA-4D0E-B131-78FC6F0D1028}" type="datetimeFigureOut">
               <a:rPr lang="en-US" smtClean="0"/>
-              <a:t>7/1/2019</a:t>
+              <a:t>7/16/2019</a:t>
             </a:fld>
             <a:endParaRPr lang="en-US"/>
           </a:p>
@@ -3456,7 +3455,7 @@
           <a:p>
             <a:fld id="{92DFD1F9-40AA-4D0E-B131-78FC6F0D1028}" type="datetimeFigureOut">
               <a:rPr lang="en-US" smtClean="0"/>
-              <a:t>7/1/2019</a:t>
+              <a:t>7/16/2019</a:t>
             </a:fld>
             <a:endParaRPr lang="en-US"/>
           </a:p>
@@ -3769,7 +3768,7 @@
           <a:p>
             <a:fld id="{92DFD1F9-40AA-4D0E-B131-78FC6F0D1028}" type="datetimeFigureOut">
               <a:rPr lang="en-US" smtClean="0"/>
-              <a:t>7/1/2019</a:t>
+              <a:t>7/16/2019</a:t>
             </a:fld>
             <a:endParaRPr lang="en-US"/>
           </a:p>
@@ -4058,7 +4057,7 @@
           <a:p>
             <a:fld id="{92DFD1F9-40AA-4D0E-B131-78FC6F0D1028}" type="datetimeFigureOut">
               <a:rPr lang="en-US" smtClean="0"/>
-              <a:t>7/1/2019</a:t>
+              <a:t>7/16/2019</a:t>
             </a:fld>
             <a:endParaRPr lang="en-US"/>
           </a:p>
@@ -4301,7 +4300,7 @@
           <a:p>
             <a:fld id="{92DFD1F9-40AA-4D0E-B131-78FC6F0D1028}" type="datetimeFigureOut">
               <a:rPr lang="en-US" smtClean="0"/>
-              <a:t>7/1/2019</a:t>
+              <a:t>7/16/2019</a:t>
             </a:fld>
             <a:endParaRPr lang="en-US"/>
           </a:p>
@@ -4733,7 +4732,7 @@
           <p:nvPr>
             <p:extLst>
               <p:ext uri="{D42A27DB-BD31-4B8C-83A1-F6EECF244321}">
-                <p14:modId xmlns:p14="http://schemas.microsoft.com/office/powerpoint/2010/main" val="26095860"/>
+                <p14:modId xmlns:p14="http://schemas.microsoft.com/office/powerpoint/2010/main" val="2788822542"/>
               </p:ext>
             </p:extLst>
           </p:nvPr>

</xml_diff>